<commit_message>
modificada URL origen de datos IECA, últimos datos y acabando presupuesto del proyecto
</commit_message>
<xml_diff>
--- a/graficos_memoria.pptx
+++ b/graficos_memoria.pptx
@@ -7,6 +7,8 @@
   <p:sldIdLst>
     <p:sldId id="256" r:id="rId2"/>
     <p:sldId id="257" r:id="rId3"/>
+    <p:sldId id="258" r:id="rId4"/>
+    <p:sldId id="259" r:id="rId5"/>
   </p:sldIdLst>
   <p:sldSz cx="12192000" cy="6858000"/>
   <p:notesSz cx="6858000" cy="9144000"/>
@@ -244,7 +246,7 @@
           <a:p>
             <a:fld id="{1BB742A7-9229-4F98-9FA5-E5C249289BD2}" type="datetimeFigureOut">
               <a:rPr lang="es-ES" smtClean="0"/>
-              <a:t>19/02/2021</a:t>
+              <a:t>12/03/2021</a:t>
             </a:fld>
             <a:endParaRPr lang="es-ES"/>
           </a:p>
@@ -414,7 +416,7 @@
           <a:p>
             <a:fld id="{1BB742A7-9229-4F98-9FA5-E5C249289BD2}" type="datetimeFigureOut">
               <a:rPr lang="es-ES" smtClean="0"/>
-              <a:t>19/02/2021</a:t>
+              <a:t>12/03/2021</a:t>
             </a:fld>
             <a:endParaRPr lang="es-ES"/>
           </a:p>
@@ -594,7 +596,7 @@
           <a:p>
             <a:fld id="{1BB742A7-9229-4F98-9FA5-E5C249289BD2}" type="datetimeFigureOut">
               <a:rPr lang="es-ES" smtClean="0"/>
-              <a:t>19/02/2021</a:t>
+              <a:t>12/03/2021</a:t>
             </a:fld>
             <a:endParaRPr lang="es-ES"/>
           </a:p>
@@ -764,7 +766,7 @@
           <a:p>
             <a:fld id="{1BB742A7-9229-4F98-9FA5-E5C249289BD2}" type="datetimeFigureOut">
               <a:rPr lang="es-ES" smtClean="0"/>
-              <a:t>19/02/2021</a:t>
+              <a:t>12/03/2021</a:t>
             </a:fld>
             <a:endParaRPr lang="es-ES"/>
           </a:p>
@@ -1010,7 +1012,7 @@
           <a:p>
             <a:fld id="{1BB742A7-9229-4F98-9FA5-E5C249289BD2}" type="datetimeFigureOut">
               <a:rPr lang="es-ES" smtClean="0"/>
-              <a:t>19/02/2021</a:t>
+              <a:t>12/03/2021</a:t>
             </a:fld>
             <a:endParaRPr lang="es-ES"/>
           </a:p>
@@ -1242,7 +1244,7 @@
           <a:p>
             <a:fld id="{1BB742A7-9229-4F98-9FA5-E5C249289BD2}" type="datetimeFigureOut">
               <a:rPr lang="es-ES" smtClean="0"/>
-              <a:t>19/02/2021</a:t>
+              <a:t>12/03/2021</a:t>
             </a:fld>
             <a:endParaRPr lang="es-ES"/>
           </a:p>
@@ -1609,7 +1611,7 @@
           <a:p>
             <a:fld id="{1BB742A7-9229-4F98-9FA5-E5C249289BD2}" type="datetimeFigureOut">
               <a:rPr lang="es-ES" smtClean="0"/>
-              <a:t>19/02/2021</a:t>
+              <a:t>12/03/2021</a:t>
             </a:fld>
             <a:endParaRPr lang="es-ES"/>
           </a:p>
@@ -1727,7 +1729,7 @@
           <a:p>
             <a:fld id="{1BB742A7-9229-4F98-9FA5-E5C249289BD2}" type="datetimeFigureOut">
               <a:rPr lang="es-ES" smtClean="0"/>
-              <a:t>19/02/2021</a:t>
+              <a:t>12/03/2021</a:t>
             </a:fld>
             <a:endParaRPr lang="es-ES"/>
           </a:p>
@@ -1822,7 +1824,7 @@
           <a:p>
             <a:fld id="{1BB742A7-9229-4F98-9FA5-E5C249289BD2}" type="datetimeFigureOut">
               <a:rPr lang="es-ES" smtClean="0"/>
-              <a:t>19/02/2021</a:t>
+              <a:t>12/03/2021</a:t>
             </a:fld>
             <a:endParaRPr lang="es-ES"/>
           </a:p>
@@ -2099,7 +2101,7 @@
           <a:p>
             <a:fld id="{1BB742A7-9229-4F98-9FA5-E5C249289BD2}" type="datetimeFigureOut">
               <a:rPr lang="es-ES" smtClean="0"/>
-              <a:t>19/02/2021</a:t>
+              <a:t>12/03/2021</a:t>
             </a:fld>
             <a:endParaRPr lang="es-ES"/>
           </a:p>
@@ -2352,7 +2354,7 @@
           <a:p>
             <a:fld id="{1BB742A7-9229-4F98-9FA5-E5C249289BD2}" type="datetimeFigureOut">
               <a:rPr lang="es-ES" smtClean="0"/>
-              <a:t>19/02/2021</a:t>
+              <a:t>12/03/2021</a:t>
             </a:fld>
             <a:endParaRPr lang="es-ES"/>
           </a:p>
@@ -2565,7 +2567,7 @@
           <a:p>
             <a:fld id="{1BB742A7-9229-4F98-9FA5-E5C249289BD2}" type="datetimeFigureOut">
               <a:rPr lang="es-ES" smtClean="0"/>
-              <a:t>19/02/2021</a:t>
+              <a:t>12/03/2021</a:t>
             </a:fld>
             <a:endParaRPr lang="es-ES"/>
           </a:p>
@@ -5719,6 +5721,894 @@
 </p:sld>
 </file>
 
+<file path=ppt/slides/slide3.xml><?xml version="1.0" encoding="utf-8"?>
+<p:sld xmlns:a="http://schemas.openxmlformats.org/drawingml/2006/main" xmlns:r="http://schemas.openxmlformats.org/officeDocument/2006/relationships" xmlns:p="http://schemas.openxmlformats.org/presentationml/2006/main">
+  <p:cSld>
+    <p:spTree>
+      <p:nvGrpSpPr>
+        <p:cNvPr id="1" name=""/>
+        <p:cNvGrpSpPr/>
+        <p:nvPr/>
+      </p:nvGrpSpPr>
+      <p:grpSpPr>
+        <a:xfrm>
+          <a:off x="0" y="0"/>
+          <a:ext cx="0" cy="0"/>
+          <a:chOff x="0" y="0"/>
+          <a:chExt cx="0" cy="0"/>
+        </a:xfrm>
+      </p:grpSpPr>
+      <p:sp>
+        <p:nvSpPr>
+          <p:cNvPr id="4" name="Elipse 3"/>
+          <p:cNvSpPr/>
+          <p:nvPr/>
+        </p:nvSpPr>
+        <p:spPr>
+          <a:xfrm>
+            <a:off x="2314576" y="971550"/>
+            <a:ext cx="1352550" cy="1295400"/>
+          </a:xfrm>
+          <a:prstGeom prst="ellipse">
+            <a:avLst/>
+          </a:prstGeom>
+        </p:spPr>
+        <p:style>
+          <a:lnRef idx="2">
+            <a:schemeClr val="accent5"/>
+          </a:lnRef>
+          <a:fillRef idx="1">
+            <a:schemeClr val="lt1"/>
+          </a:fillRef>
+          <a:effectRef idx="0">
+            <a:schemeClr val="accent5"/>
+          </a:effectRef>
+          <a:fontRef idx="minor">
+            <a:schemeClr val="dk1"/>
+          </a:fontRef>
+        </p:style>
+        <p:txBody>
+          <a:bodyPr rtlCol="0" anchor="ctr"/>
+          <a:lstStyle/>
+          <a:p>
+            <a:pPr algn="ctr"/>
+            <a:r>
+              <a:rPr lang="es-ES" dirty="0" smtClean="0"/>
+              <a:t>I.E.C.A.</a:t>
+            </a:r>
+            <a:endParaRPr lang="es-ES" dirty="0"/>
+          </a:p>
+        </p:txBody>
+      </p:sp>
+      <p:sp>
+        <p:nvSpPr>
+          <p:cNvPr id="5" name="Elipse 4"/>
+          <p:cNvSpPr/>
+          <p:nvPr/>
+        </p:nvSpPr>
+        <p:spPr>
+          <a:xfrm>
+            <a:off x="7715250" y="5057775"/>
+            <a:ext cx="1352550" cy="1295400"/>
+          </a:xfrm>
+          <a:prstGeom prst="ellipse">
+            <a:avLst/>
+          </a:prstGeom>
+        </p:spPr>
+        <p:style>
+          <a:lnRef idx="2">
+            <a:schemeClr val="accent5"/>
+          </a:lnRef>
+          <a:fillRef idx="1">
+            <a:schemeClr val="lt1"/>
+          </a:fillRef>
+          <a:effectRef idx="0">
+            <a:schemeClr val="accent5"/>
+          </a:effectRef>
+          <a:fontRef idx="minor">
+            <a:schemeClr val="dk1"/>
+          </a:fontRef>
+        </p:style>
+        <p:txBody>
+          <a:bodyPr rtlCol="0" anchor="ctr"/>
+          <a:lstStyle/>
+          <a:p>
+            <a:pPr algn="ctr"/>
+            <a:r>
+              <a:rPr lang="es-ES" dirty="0" smtClean="0"/>
+              <a:t>Decisor</a:t>
+            </a:r>
+            <a:endParaRPr lang="es-ES" dirty="0"/>
+          </a:p>
+        </p:txBody>
+      </p:sp>
+      <p:sp>
+        <p:nvSpPr>
+          <p:cNvPr id="6" name="Elipse 5"/>
+          <p:cNvSpPr/>
+          <p:nvPr/>
+        </p:nvSpPr>
+        <p:spPr>
+          <a:xfrm>
+            <a:off x="7715251" y="971550"/>
+            <a:ext cx="1352550" cy="1295400"/>
+          </a:xfrm>
+          <a:prstGeom prst="ellipse">
+            <a:avLst/>
+          </a:prstGeom>
+        </p:spPr>
+        <p:style>
+          <a:lnRef idx="2">
+            <a:schemeClr val="accent5"/>
+          </a:lnRef>
+          <a:fillRef idx="1">
+            <a:schemeClr val="lt1"/>
+          </a:fillRef>
+          <a:effectRef idx="0">
+            <a:schemeClr val="accent5"/>
+          </a:effectRef>
+          <a:fontRef idx="minor">
+            <a:schemeClr val="dk1"/>
+          </a:fontRef>
+        </p:style>
+        <p:txBody>
+          <a:bodyPr rtlCol="0" anchor="ctr"/>
+          <a:lstStyle/>
+          <a:p>
+            <a:pPr algn="ctr"/>
+            <a:r>
+              <a:rPr lang="es-ES" dirty="0" smtClean="0"/>
+              <a:t>Técnico</a:t>
+            </a:r>
+            <a:endParaRPr lang="es-ES" dirty="0"/>
+          </a:p>
+        </p:txBody>
+      </p:sp>
+      <p:cxnSp>
+        <p:nvCxnSpPr>
+          <p:cNvPr id="8" name="Conector recto 7"/>
+          <p:cNvCxnSpPr>
+            <a:stCxn id="6" idx="2"/>
+            <a:endCxn id="4" idx="6"/>
+          </p:cNvCxnSpPr>
+          <p:nvPr/>
+        </p:nvCxnSpPr>
+        <p:spPr>
+          <a:xfrm flipH="1">
+            <a:off x="3667126" y="1619250"/>
+            <a:ext cx="4048125" cy="0"/>
+          </a:xfrm>
+          <a:prstGeom prst="line">
+            <a:avLst/>
+          </a:prstGeom>
+        </p:spPr>
+        <p:style>
+          <a:lnRef idx="1">
+            <a:schemeClr val="accent1"/>
+          </a:lnRef>
+          <a:fillRef idx="0">
+            <a:schemeClr val="accent1"/>
+          </a:fillRef>
+          <a:effectRef idx="0">
+            <a:schemeClr val="accent1"/>
+          </a:effectRef>
+          <a:fontRef idx="minor">
+            <a:schemeClr val="tx1"/>
+          </a:fontRef>
+        </p:style>
+      </p:cxnSp>
+      <p:sp>
+        <p:nvSpPr>
+          <p:cNvPr id="10" name="Retraso 9"/>
+          <p:cNvSpPr/>
+          <p:nvPr/>
+        </p:nvSpPr>
+        <p:spPr>
+          <a:xfrm rot="10800000">
+            <a:off x="4238625" y="1343025"/>
+            <a:ext cx="533399" cy="552450"/>
+          </a:xfrm>
+          <a:prstGeom prst="flowChartDelay">
+            <a:avLst/>
+          </a:prstGeom>
+          <a:noFill/>
+        </p:spPr>
+        <p:style>
+          <a:lnRef idx="2">
+            <a:schemeClr val="accent1"/>
+          </a:lnRef>
+          <a:fillRef idx="1">
+            <a:schemeClr val="lt1"/>
+          </a:fillRef>
+          <a:effectRef idx="0">
+            <a:schemeClr val="accent1"/>
+          </a:effectRef>
+          <a:fontRef idx="minor">
+            <a:schemeClr val="dk1"/>
+          </a:fontRef>
+        </p:style>
+        <p:txBody>
+          <a:bodyPr rtlCol="0" anchor="ctr"/>
+          <a:lstStyle/>
+          <a:p>
+            <a:pPr algn="ctr"/>
+            <a:endParaRPr lang="es-ES"/>
+          </a:p>
+        </p:txBody>
+      </p:sp>
+      <p:cxnSp>
+        <p:nvCxnSpPr>
+          <p:cNvPr id="12" name="Conector recto 11"/>
+          <p:cNvCxnSpPr>
+            <a:stCxn id="5" idx="0"/>
+            <a:endCxn id="6" idx="4"/>
+          </p:cNvCxnSpPr>
+          <p:nvPr/>
+        </p:nvCxnSpPr>
+        <p:spPr>
+          <a:xfrm flipV="1">
+            <a:off x="8391525" y="2266950"/>
+            <a:ext cx="1" cy="2790825"/>
+          </a:xfrm>
+          <a:prstGeom prst="line">
+            <a:avLst/>
+          </a:prstGeom>
+        </p:spPr>
+        <p:style>
+          <a:lnRef idx="1">
+            <a:schemeClr val="accent1"/>
+          </a:lnRef>
+          <a:fillRef idx="0">
+            <a:schemeClr val="accent1"/>
+          </a:fillRef>
+          <a:effectRef idx="0">
+            <a:schemeClr val="accent1"/>
+          </a:effectRef>
+          <a:fontRef idx="minor">
+            <a:schemeClr val="tx1"/>
+          </a:fontRef>
+        </p:style>
+      </p:cxnSp>
+      <p:sp>
+        <p:nvSpPr>
+          <p:cNvPr id="15" name="Rectángulo redondeado 14"/>
+          <p:cNvSpPr/>
+          <p:nvPr/>
+        </p:nvSpPr>
+        <p:spPr>
+          <a:xfrm>
+            <a:off x="5591175" y="1257300"/>
+            <a:ext cx="1457325" cy="790575"/>
+          </a:xfrm>
+          <a:prstGeom prst="roundRect">
+            <a:avLst>
+              <a:gd name="adj" fmla="val 34739"/>
+            </a:avLst>
+          </a:prstGeom>
+        </p:spPr>
+        <p:style>
+          <a:lnRef idx="2">
+            <a:schemeClr val="accent1"/>
+          </a:lnRef>
+          <a:fillRef idx="1">
+            <a:schemeClr val="lt1"/>
+          </a:fillRef>
+          <a:effectRef idx="0">
+            <a:schemeClr val="accent1"/>
+          </a:effectRef>
+          <a:fontRef idx="minor">
+            <a:schemeClr val="dk1"/>
+          </a:fontRef>
+        </p:style>
+        <p:txBody>
+          <a:bodyPr rtlCol="0" anchor="ctr"/>
+          <a:lstStyle/>
+          <a:p>
+            <a:pPr algn="ctr"/>
+            <a:r>
+              <a:rPr lang="es-ES" dirty="0" smtClean="0"/>
+              <a:t>recopila datos</a:t>
+            </a:r>
+            <a:endParaRPr lang="es-ES" dirty="0"/>
+          </a:p>
+        </p:txBody>
+      </p:sp>
+      <p:sp>
+        <p:nvSpPr>
+          <p:cNvPr id="16" name="Rectángulo redondeado 15"/>
+          <p:cNvSpPr/>
+          <p:nvPr/>
+        </p:nvSpPr>
+        <p:spPr>
+          <a:xfrm>
+            <a:off x="7662862" y="3495677"/>
+            <a:ext cx="1457325" cy="790575"/>
+          </a:xfrm>
+          <a:prstGeom prst="roundRect">
+            <a:avLst>
+              <a:gd name="adj" fmla="val 34739"/>
+            </a:avLst>
+          </a:prstGeom>
+        </p:spPr>
+        <p:style>
+          <a:lnRef idx="2">
+            <a:schemeClr val="accent1"/>
+          </a:lnRef>
+          <a:fillRef idx="1">
+            <a:schemeClr val="lt1"/>
+          </a:fillRef>
+          <a:effectRef idx="0">
+            <a:schemeClr val="accent1"/>
+          </a:effectRef>
+          <a:fontRef idx="minor">
+            <a:schemeClr val="dk1"/>
+          </a:fontRef>
+        </p:style>
+        <p:txBody>
+          <a:bodyPr rtlCol="0" anchor="ctr"/>
+          <a:lstStyle/>
+          <a:p>
+            <a:pPr algn="ctr"/>
+            <a:r>
+              <a:rPr lang="es-ES" dirty="0" smtClean="0"/>
+              <a:t>toma decisiones</a:t>
+            </a:r>
+            <a:endParaRPr lang="es-ES" dirty="0"/>
+          </a:p>
+        </p:txBody>
+      </p:sp>
+      <p:sp>
+        <p:nvSpPr>
+          <p:cNvPr id="18" name="Retraso 17"/>
+          <p:cNvSpPr/>
+          <p:nvPr/>
+        </p:nvSpPr>
+        <p:spPr>
+          <a:xfrm rot="16200000">
+            <a:off x="8124826" y="2638424"/>
+            <a:ext cx="533399" cy="552450"/>
+          </a:xfrm>
+          <a:prstGeom prst="flowChartDelay">
+            <a:avLst/>
+          </a:prstGeom>
+          <a:noFill/>
+        </p:spPr>
+        <p:style>
+          <a:lnRef idx="2">
+            <a:schemeClr val="accent1"/>
+          </a:lnRef>
+          <a:fillRef idx="1">
+            <a:schemeClr val="lt1"/>
+          </a:fillRef>
+          <a:effectRef idx="0">
+            <a:schemeClr val="accent1"/>
+          </a:effectRef>
+          <a:fontRef idx="minor">
+            <a:schemeClr val="dk1"/>
+          </a:fontRef>
+        </p:style>
+        <p:txBody>
+          <a:bodyPr rtlCol="0" anchor="ctr"/>
+          <a:lstStyle/>
+          <a:p>
+            <a:pPr algn="ctr"/>
+            <a:endParaRPr lang="es-ES"/>
+          </a:p>
+        </p:txBody>
+      </p:sp>
+    </p:spTree>
+    <p:extLst>
+      <p:ext uri="{BB962C8B-B14F-4D97-AF65-F5344CB8AC3E}">
+        <p14:creationId xmlns:p14="http://schemas.microsoft.com/office/powerpoint/2010/main" val="1189896069"/>
+      </p:ext>
+    </p:extLst>
+  </p:cSld>
+  <p:clrMapOvr>
+    <a:masterClrMapping/>
+  </p:clrMapOvr>
+</p:sld>
+</file>
+
+<file path=ppt/slides/slide4.xml><?xml version="1.0" encoding="utf-8"?>
+<p:sld xmlns:a="http://schemas.openxmlformats.org/drawingml/2006/main" xmlns:r="http://schemas.openxmlformats.org/officeDocument/2006/relationships" xmlns:p="http://schemas.openxmlformats.org/presentationml/2006/main">
+  <p:cSld>
+    <p:spTree>
+      <p:nvGrpSpPr>
+        <p:cNvPr id="1" name=""/>
+        <p:cNvGrpSpPr/>
+        <p:nvPr/>
+      </p:nvGrpSpPr>
+      <p:grpSpPr>
+        <a:xfrm>
+          <a:off x="0" y="0"/>
+          <a:ext cx="0" cy="0"/>
+          <a:chOff x="0" y="0"/>
+          <a:chExt cx="0" cy="0"/>
+        </a:xfrm>
+      </p:grpSpPr>
+      <p:sp>
+        <p:nvSpPr>
+          <p:cNvPr id="2" name="Elipse 1"/>
+          <p:cNvSpPr/>
+          <p:nvPr/>
+        </p:nvSpPr>
+        <p:spPr>
+          <a:xfrm>
+            <a:off x="1002143" y="939277"/>
+            <a:ext cx="1352550" cy="1295400"/>
+          </a:xfrm>
+          <a:prstGeom prst="ellipse">
+            <a:avLst/>
+          </a:prstGeom>
+        </p:spPr>
+        <p:style>
+          <a:lnRef idx="2">
+            <a:schemeClr val="accent5"/>
+          </a:lnRef>
+          <a:fillRef idx="1">
+            <a:schemeClr val="lt1"/>
+          </a:fillRef>
+          <a:effectRef idx="0">
+            <a:schemeClr val="accent5"/>
+          </a:effectRef>
+          <a:fontRef idx="minor">
+            <a:schemeClr val="dk1"/>
+          </a:fontRef>
+        </p:style>
+        <p:txBody>
+          <a:bodyPr rtlCol="0" anchor="ctr"/>
+          <a:lstStyle/>
+          <a:p>
+            <a:pPr algn="ctr"/>
+            <a:r>
+              <a:rPr lang="es-ES" dirty="0" smtClean="0"/>
+              <a:t>I.E.C.A.</a:t>
+            </a:r>
+            <a:endParaRPr lang="es-ES" dirty="0"/>
+          </a:p>
+        </p:txBody>
+      </p:sp>
+      <p:sp>
+        <p:nvSpPr>
+          <p:cNvPr id="4" name="Rectángulo redondeado 3"/>
+          <p:cNvSpPr/>
+          <p:nvPr/>
+        </p:nvSpPr>
+        <p:spPr>
+          <a:xfrm>
+            <a:off x="3450403" y="1839389"/>
+            <a:ext cx="1457325" cy="790575"/>
+          </a:xfrm>
+          <a:prstGeom prst="roundRect">
+            <a:avLst>
+              <a:gd name="adj" fmla="val 34739"/>
+            </a:avLst>
+          </a:prstGeom>
+        </p:spPr>
+        <p:style>
+          <a:lnRef idx="2">
+            <a:schemeClr val="accent1"/>
+          </a:lnRef>
+          <a:fillRef idx="1">
+            <a:schemeClr val="lt1"/>
+          </a:fillRef>
+          <a:effectRef idx="0">
+            <a:schemeClr val="accent1"/>
+          </a:effectRef>
+          <a:fontRef idx="minor">
+            <a:schemeClr val="dk1"/>
+          </a:fontRef>
+        </p:style>
+        <p:txBody>
+          <a:bodyPr rtlCol="0" anchor="ctr"/>
+          <a:lstStyle/>
+          <a:p>
+            <a:pPr algn="ctr"/>
+            <a:r>
+              <a:rPr lang="es-ES" dirty="0"/>
+              <a:t>r</a:t>
+            </a:r>
+            <a:r>
+              <a:rPr lang="es-ES" dirty="0" smtClean="0"/>
+              <a:t>ecoger datos</a:t>
+            </a:r>
+            <a:endParaRPr lang="es-ES" dirty="0"/>
+          </a:p>
+        </p:txBody>
+      </p:sp>
+      <p:sp>
+        <p:nvSpPr>
+          <p:cNvPr id="5" name="Rectángulo redondeado 4"/>
+          <p:cNvSpPr/>
+          <p:nvPr/>
+        </p:nvSpPr>
+        <p:spPr>
+          <a:xfrm>
+            <a:off x="5558900" y="3335319"/>
+            <a:ext cx="1457325" cy="790575"/>
+          </a:xfrm>
+          <a:prstGeom prst="roundRect">
+            <a:avLst>
+              <a:gd name="adj" fmla="val 34739"/>
+            </a:avLst>
+          </a:prstGeom>
+        </p:spPr>
+        <p:style>
+          <a:lnRef idx="2">
+            <a:schemeClr val="accent1"/>
+          </a:lnRef>
+          <a:fillRef idx="1">
+            <a:schemeClr val="lt1"/>
+          </a:fillRef>
+          <a:effectRef idx="0">
+            <a:schemeClr val="accent1"/>
+          </a:effectRef>
+          <a:fontRef idx="minor">
+            <a:schemeClr val="dk1"/>
+          </a:fontRef>
+        </p:style>
+        <p:txBody>
+          <a:bodyPr rtlCol="0" anchor="ctr"/>
+          <a:lstStyle/>
+          <a:p>
+            <a:pPr algn="ctr"/>
+            <a:r>
+              <a:rPr lang="es-ES" dirty="0"/>
+              <a:t>p</a:t>
+            </a:r>
+            <a:r>
+              <a:rPr lang="es-ES" dirty="0" smtClean="0"/>
+              <a:t>rocesar datos</a:t>
+            </a:r>
+            <a:endParaRPr lang="es-ES" dirty="0"/>
+          </a:p>
+        </p:txBody>
+      </p:sp>
+      <p:sp>
+        <p:nvSpPr>
+          <p:cNvPr id="6" name="Rectángulo redondeado 5"/>
+          <p:cNvSpPr/>
+          <p:nvPr/>
+        </p:nvSpPr>
+        <p:spPr>
+          <a:xfrm>
+            <a:off x="1915646" y="4095863"/>
+            <a:ext cx="1457325" cy="790575"/>
+          </a:xfrm>
+          <a:prstGeom prst="roundRect">
+            <a:avLst>
+              <a:gd name="adj" fmla="val 34739"/>
+            </a:avLst>
+          </a:prstGeom>
+        </p:spPr>
+        <p:style>
+          <a:lnRef idx="2">
+            <a:schemeClr val="accent1"/>
+          </a:lnRef>
+          <a:fillRef idx="1">
+            <a:schemeClr val="lt1"/>
+          </a:fillRef>
+          <a:effectRef idx="0">
+            <a:schemeClr val="accent1"/>
+          </a:effectRef>
+          <a:fontRef idx="minor">
+            <a:schemeClr val="dk1"/>
+          </a:fontRef>
+        </p:style>
+        <p:txBody>
+          <a:bodyPr rtlCol="0" anchor="ctr"/>
+          <a:lstStyle/>
+          <a:p>
+            <a:pPr algn="ctr"/>
+            <a:r>
+              <a:rPr lang="es-ES" dirty="0" smtClean="0"/>
+              <a:t>publicar datos</a:t>
+            </a:r>
+            <a:endParaRPr lang="es-ES" dirty="0"/>
+          </a:p>
+        </p:txBody>
+      </p:sp>
+      <p:sp>
+        <p:nvSpPr>
+          <p:cNvPr id="7" name="Forma libre 6"/>
+          <p:cNvSpPr/>
+          <p:nvPr/>
+        </p:nvSpPr>
+        <p:spPr>
+          <a:xfrm>
+            <a:off x="4916244" y="2200536"/>
+            <a:ext cx="1344706" cy="1134334"/>
+          </a:xfrm>
+          <a:custGeom>
+            <a:avLst/>
+            <a:gdLst>
+              <a:gd name="connsiteX0" fmla="*/ 0 w 1344706"/>
+              <a:gd name="connsiteY0" fmla="*/ 15539 h 1134334"/>
+              <a:gd name="connsiteX1" fmla="*/ 946673 w 1344706"/>
+              <a:gd name="connsiteY1" fmla="*/ 155388 h 1134334"/>
+              <a:gd name="connsiteX2" fmla="*/ 1344706 w 1344706"/>
+              <a:gd name="connsiteY2" fmla="*/ 1134334 h 1134334"/>
+            </a:gdLst>
+            <a:ahLst/>
+            <a:cxnLst>
+              <a:cxn ang="0">
+                <a:pos x="connsiteX0" y="connsiteY0"/>
+              </a:cxn>
+              <a:cxn ang="0">
+                <a:pos x="connsiteX1" y="connsiteY1"/>
+              </a:cxn>
+              <a:cxn ang="0">
+                <a:pos x="connsiteX2" y="connsiteY2"/>
+              </a:cxn>
+            </a:cxnLst>
+            <a:rect l="l" t="t" r="r" b="b"/>
+            <a:pathLst>
+              <a:path w="1344706" h="1134334">
+                <a:moveTo>
+                  <a:pt x="0" y="15539"/>
+                </a:moveTo>
+                <a:cubicBezTo>
+                  <a:pt x="361277" y="-7770"/>
+                  <a:pt x="722555" y="-31078"/>
+                  <a:pt x="946673" y="155388"/>
+                </a:cubicBezTo>
+                <a:cubicBezTo>
+                  <a:pt x="1170791" y="341854"/>
+                  <a:pt x="1257748" y="738094"/>
+                  <a:pt x="1344706" y="1134334"/>
+                </a:cubicBezTo>
+              </a:path>
+            </a:pathLst>
+          </a:custGeom>
+          <a:noFill/>
+          <a:ln>
+            <a:headEnd type="none" w="med" len="med"/>
+            <a:tailEnd type="arrow" w="med" len="med"/>
+          </a:ln>
+        </p:spPr>
+        <p:style>
+          <a:lnRef idx="2">
+            <a:schemeClr val="accent1">
+              <a:shade val="50000"/>
+            </a:schemeClr>
+          </a:lnRef>
+          <a:fillRef idx="1">
+            <a:schemeClr val="accent1"/>
+          </a:fillRef>
+          <a:effectRef idx="0">
+            <a:schemeClr val="accent1"/>
+          </a:effectRef>
+          <a:fontRef idx="minor">
+            <a:schemeClr val="lt1"/>
+          </a:fontRef>
+        </p:style>
+        <p:txBody>
+          <a:bodyPr rtlCol="0" anchor="ctr"/>
+          <a:lstStyle/>
+          <a:p>
+            <a:pPr algn="ctr"/>
+            <a:endParaRPr lang="es-ES"/>
+          </a:p>
+        </p:txBody>
+      </p:sp>
+      <p:sp>
+        <p:nvSpPr>
+          <p:cNvPr id="8" name="Forma libre 7"/>
+          <p:cNvSpPr/>
+          <p:nvPr/>
+        </p:nvSpPr>
+        <p:spPr>
+          <a:xfrm rot="7156214">
+            <a:off x="3670823" y="3395624"/>
+            <a:ext cx="1626758" cy="1616441"/>
+          </a:xfrm>
+          <a:custGeom>
+            <a:avLst/>
+            <a:gdLst>
+              <a:gd name="connsiteX0" fmla="*/ 0 w 1344706"/>
+              <a:gd name="connsiteY0" fmla="*/ 15539 h 1134334"/>
+              <a:gd name="connsiteX1" fmla="*/ 946673 w 1344706"/>
+              <a:gd name="connsiteY1" fmla="*/ 155388 h 1134334"/>
+              <a:gd name="connsiteX2" fmla="*/ 1344706 w 1344706"/>
+              <a:gd name="connsiteY2" fmla="*/ 1134334 h 1134334"/>
+            </a:gdLst>
+            <a:ahLst/>
+            <a:cxnLst>
+              <a:cxn ang="0">
+                <a:pos x="connsiteX0" y="connsiteY0"/>
+              </a:cxn>
+              <a:cxn ang="0">
+                <a:pos x="connsiteX1" y="connsiteY1"/>
+              </a:cxn>
+              <a:cxn ang="0">
+                <a:pos x="connsiteX2" y="connsiteY2"/>
+              </a:cxn>
+            </a:cxnLst>
+            <a:rect l="l" t="t" r="r" b="b"/>
+            <a:pathLst>
+              <a:path w="1344706" h="1134334">
+                <a:moveTo>
+                  <a:pt x="0" y="15539"/>
+                </a:moveTo>
+                <a:cubicBezTo>
+                  <a:pt x="361277" y="-7770"/>
+                  <a:pt x="722555" y="-31078"/>
+                  <a:pt x="946673" y="155388"/>
+                </a:cubicBezTo>
+                <a:cubicBezTo>
+                  <a:pt x="1170791" y="341854"/>
+                  <a:pt x="1257748" y="738094"/>
+                  <a:pt x="1344706" y="1134334"/>
+                </a:cubicBezTo>
+              </a:path>
+            </a:pathLst>
+          </a:custGeom>
+          <a:noFill/>
+          <a:ln>
+            <a:headEnd type="none" w="med" len="med"/>
+            <a:tailEnd type="arrow" w="med" len="med"/>
+          </a:ln>
+        </p:spPr>
+        <p:style>
+          <a:lnRef idx="2">
+            <a:schemeClr val="accent1">
+              <a:shade val="50000"/>
+            </a:schemeClr>
+          </a:lnRef>
+          <a:fillRef idx="1">
+            <a:schemeClr val="accent1"/>
+          </a:fillRef>
+          <a:effectRef idx="0">
+            <a:schemeClr val="accent1"/>
+          </a:effectRef>
+          <a:fontRef idx="minor">
+            <a:schemeClr val="lt1"/>
+          </a:fontRef>
+        </p:style>
+        <p:txBody>
+          <a:bodyPr rtlCol="0" anchor="ctr"/>
+          <a:lstStyle/>
+          <a:p>
+            <a:pPr algn="ctr"/>
+            <a:endParaRPr lang="es-ES"/>
+          </a:p>
+        </p:txBody>
+      </p:sp>
+      <p:sp>
+        <p:nvSpPr>
+          <p:cNvPr id="9" name="Rectángulo 8"/>
+          <p:cNvSpPr/>
+          <p:nvPr/>
+        </p:nvSpPr>
+        <p:spPr>
+          <a:xfrm>
+            <a:off x="7498081" y="2200367"/>
+            <a:ext cx="2388197" cy="763793"/>
+          </a:xfrm>
+          <a:prstGeom prst="rect">
+            <a:avLst/>
+          </a:prstGeom>
+        </p:spPr>
+        <p:style>
+          <a:lnRef idx="2">
+            <a:schemeClr val="accent1"/>
+          </a:lnRef>
+          <a:fillRef idx="1">
+            <a:schemeClr val="lt1"/>
+          </a:fillRef>
+          <a:effectRef idx="0">
+            <a:schemeClr val="accent1"/>
+          </a:effectRef>
+          <a:fontRef idx="minor">
+            <a:schemeClr val="dk1"/>
+          </a:fontRef>
+        </p:style>
+        <p:txBody>
+          <a:bodyPr rtlCol="0" anchor="ctr"/>
+          <a:lstStyle/>
+          <a:p>
+            <a:pPr algn="ctr"/>
+            <a:r>
+              <a:rPr lang="es-ES" dirty="0" smtClean="0"/>
+              <a:t>Datos estadísticos generales</a:t>
+            </a:r>
+            <a:endParaRPr lang="es-ES" dirty="0"/>
+          </a:p>
+        </p:txBody>
+      </p:sp>
+      <p:cxnSp>
+        <p:nvCxnSpPr>
+          <p:cNvPr id="11" name="Conector recto de flecha 10"/>
+          <p:cNvCxnSpPr>
+            <a:stCxn id="9" idx="2"/>
+            <a:endCxn id="5" idx="3"/>
+          </p:cNvCxnSpPr>
+          <p:nvPr/>
+        </p:nvCxnSpPr>
+        <p:spPr>
+          <a:xfrm flipH="1">
+            <a:off x="7016225" y="2964160"/>
+            <a:ext cx="1675955" cy="766447"/>
+          </a:xfrm>
+          <a:prstGeom prst="straightConnector1">
+            <a:avLst/>
+          </a:prstGeom>
+          <a:ln>
+            <a:tailEnd type="triangle" w="lg" len="lg"/>
+          </a:ln>
+        </p:spPr>
+        <p:style>
+          <a:lnRef idx="1">
+            <a:schemeClr val="accent1"/>
+          </a:lnRef>
+          <a:fillRef idx="0">
+            <a:schemeClr val="accent1"/>
+          </a:fillRef>
+          <a:effectRef idx="0">
+            <a:schemeClr val="accent1"/>
+          </a:effectRef>
+          <a:fontRef idx="minor">
+            <a:schemeClr val="tx1"/>
+          </a:fontRef>
+        </p:style>
+      </p:cxnSp>
+      <p:sp>
+        <p:nvSpPr>
+          <p:cNvPr id="12" name="Triángulo isósceles 11"/>
+          <p:cNvSpPr/>
+          <p:nvPr/>
+        </p:nvSpPr>
+        <p:spPr>
+          <a:xfrm rot="14667405">
+            <a:off x="7007560" y="3617798"/>
+            <a:ext cx="165063" cy="163226"/>
+          </a:xfrm>
+          <a:prstGeom prst="triangle">
+            <a:avLst/>
+          </a:prstGeom>
+          <a:solidFill>
+            <a:schemeClr val="bg1"/>
+          </a:solidFill>
+          <a:ln w="3175"/>
+        </p:spPr>
+        <p:style>
+          <a:lnRef idx="2">
+            <a:schemeClr val="accent1">
+              <a:shade val="50000"/>
+            </a:schemeClr>
+          </a:lnRef>
+          <a:fillRef idx="1">
+            <a:schemeClr val="accent1"/>
+          </a:fillRef>
+          <a:effectRef idx="0">
+            <a:schemeClr val="accent1"/>
+          </a:effectRef>
+          <a:fontRef idx="minor">
+            <a:schemeClr val="lt1"/>
+          </a:fontRef>
+        </p:style>
+        <p:txBody>
+          <a:bodyPr rtlCol="0" anchor="ctr"/>
+          <a:lstStyle/>
+          <a:p>
+            <a:pPr algn="ctr"/>
+            <a:endParaRPr lang="es-ES"/>
+          </a:p>
+        </p:txBody>
+      </p:sp>
+    </p:spTree>
+    <p:extLst>
+      <p:ext uri="{BB962C8B-B14F-4D97-AF65-F5344CB8AC3E}">
+        <p14:creationId xmlns:p14="http://schemas.microsoft.com/office/powerpoint/2010/main" val="1014927775"/>
+      </p:ext>
+    </p:extLst>
+  </p:cSld>
+  <p:clrMapOvr>
+    <a:masterClrMapping/>
+  </p:clrMapOvr>
+</p:sld>
+</file>
+
 <file path=ppt/theme/theme1.xml><?xml version="1.0" encoding="utf-8"?>
 <a:theme xmlns:a="http://schemas.openxmlformats.org/drawingml/2006/main" name="Tema de Office">
   <a:themeElements>

</xml_diff>